<commit_message>
add unit price info
</commit_message>
<xml_diff>
--- a/발표자료/API 텀프로젝트 발표자료.pptx
+++ b/발표자료/API 텀프로젝트 발표자료.pptx
@@ -123,6 +123,18 @@
 </p:presentation>
 </file>
 
+<file path=ppt/commentAuthors.xml><?xml version="1.0" encoding="utf-8"?>
+<p:cmAuthorLst xmlns:a="http://schemas.openxmlformats.org/drawingml/2006/main" xmlns:r="http://schemas.openxmlformats.org/officeDocument/2006/relationships" xmlns:p="http://schemas.openxmlformats.org/presentationml/2006/main">
+  <p:cmAuthor id="1" name="송주희" initials="송" lastIdx="3" clrIdx="0">
+    <p:extLst>
+      <p:ext uri="{19B8F6BF-5375-455C-9EA6-DF929625EA0E}">
+        <p15:presenceInfo xmlns:p15="http://schemas.microsoft.com/office/powerpoint/2012/main" userId="0c9b95620b356ef4" providerId="Windows Live"/>
+      </p:ext>
+    </p:extLst>
+  </p:cmAuthor>
+</p:cmAuthorLst>
+</file>
+
 <file path=ppt/revisionInfo.xml><?xml version="1.0" encoding="utf-8"?>
 <p1510:revInfo xmlns:a="http://schemas.openxmlformats.org/drawingml/2006/main" xmlns:r="http://schemas.openxmlformats.org/officeDocument/2006/relationships" xmlns:p1510="http://schemas.microsoft.com/office/powerpoint/2015/10/main"/>
 </file>
@@ -672,6 +684,17 @@
 <file path=ppt/slideLayouts/slideLayout2.xml><?xml version="1.0" encoding="utf-8"?>
 <p:sldLayout xmlns:a="http://schemas.openxmlformats.org/drawingml/2006/main" xmlns:r="http://schemas.openxmlformats.org/officeDocument/2006/relationships" xmlns:p="http://schemas.openxmlformats.org/presentationml/2006/main" type="obj" preserve="1">
   <p:cSld name="제목 및 내용">
+    <p:bg>
+      <p:bgPr>
+        <a:solidFill>
+          <a:schemeClr val="tx1">
+            <a:lumMod val="85000"/>
+            <a:lumOff val="15000"/>
+          </a:schemeClr>
+        </a:solidFill>
+        <a:effectLst/>
+      </p:bgPr>
+    </p:bg>
     <p:spTree>
       <p:nvGrpSpPr>
         <p:cNvPr id="1" name=""/>
@@ -2433,9 +2456,15 @@
 <p:sldMaster xmlns:a="http://schemas.openxmlformats.org/drawingml/2006/main" xmlns:r="http://schemas.openxmlformats.org/officeDocument/2006/relationships" xmlns:p="http://schemas.openxmlformats.org/presentationml/2006/main">
   <p:cSld>
     <p:bg>
-      <p:bgRef idx="1001">
-        <a:schemeClr val="bg1"/>
-      </p:bgRef>
+      <p:bgPr>
+        <a:solidFill>
+          <a:schemeClr val="tx1">
+            <a:lumMod val="85000"/>
+            <a:lumOff val="15000"/>
+          </a:schemeClr>
+        </a:solidFill>
+        <a:effectLst/>
+      </p:bgPr>
     </p:bg>
     <p:spTree>
       <p:nvGrpSpPr>
@@ -2477,7 +2506,7 @@
           <a:lstStyle/>
           <a:p>
             <a:r>
-              <a:rPr lang="ko-KR" altLang="en-US"/>
+              <a:rPr lang="ko-KR" altLang="en-US" dirty="0"/>
               <a:t>마스터 제목 스타일 편집</a:t>
             </a:r>
             <a:endParaRPr lang="en-US" dirty="0"/>
@@ -2511,35 +2540,35 @@
           <a:p>
             <a:pPr lvl="0"/>
             <a:r>
-              <a:rPr lang="ko-KR" altLang="en-US"/>
+              <a:rPr lang="ko-KR" altLang="en-US" dirty="0"/>
               <a:t>마스터 텍스트 스타일 편집</a:t>
             </a:r>
           </a:p>
           <a:p>
             <a:pPr lvl="1"/>
             <a:r>
-              <a:rPr lang="ko-KR" altLang="en-US"/>
+              <a:rPr lang="ko-KR" altLang="en-US" dirty="0"/>
               <a:t>둘째 수준</a:t>
             </a:r>
           </a:p>
           <a:p>
             <a:pPr lvl="2"/>
             <a:r>
-              <a:rPr lang="ko-KR" altLang="en-US"/>
+              <a:rPr lang="ko-KR" altLang="en-US" dirty="0"/>
               <a:t>셋째 수준</a:t>
             </a:r>
           </a:p>
           <a:p>
             <a:pPr lvl="3"/>
             <a:r>
-              <a:rPr lang="ko-KR" altLang="en-US"/>
+              <a:rPr lang="ko-KR" altLang="en-US" dirty="0"/>
               <a:t>넷째 수준</a:t>
             </a:r>
           </a:p>
           <a:p>
             <a:pPr lvl="4"/>
             <a:r>
-              <a:rPr lang="ko-KR" altLang="en-US"/>
+              <a:rPr lang="ko-KR" altLang="en-US" dirty="0"/>
               <a:t>다섯째 수준</a:t>
             </a:r>
             <a:endParaRPr lang="en-US" dirty="0"/>
@@ -2698,7 +2727,7 @@
         <a:buNone/>
         <a:defRPr sz="4400" kern="1200">
           <a:solidFill>
-            <a:schemeClr val="tx1"/>
+            <a:schemeClr val="bg1"/>
           </a:solidFill>
           <a:latin typeface="+mj-lt"/>
           <a:ea typeface="+mj-ea"/>
@@ -2718,7 +2747,7 @@
         <a:buChar char="•"/>
         <a:defRPr sz="2800" kern="1200">
           <a:solidFill>
-            <a:schemeClr val="tx1"/>
+            <a:schemeClr val="bg1"/>
           </a:solidFill>
           <a:latin typeface="+mn-lt"/>
           <a:ea typeface="+mn-ea"/>
@@ -2736,7 +2765,7 @@
         <a:buChar char="•"/>
         <a:defRPr sz="2400" kern="1200">
           <a:solidFill>
-            <a:schemeClr val="tx1"/>
+            <a:schemeClr val="bg1"/>
           </a:solidFill>
           <a:latin typeface="+mn-lt"/>
           <a:ea typeface="+mn-ea"/>
@@ -2754,7 +2783,7 @@
         <a:buChar char="•"/>
         <a:defRPr sz="2000" kern="1200">
           <a:solidFill>
-            <a:schemeClr val="tx1"/>
+            <a:schemeClr val="bg1"/>
           </a:solidFill>
           <a:latin typeface="+mn-lt"/>
           <a:ea typeface="+mn-ea"/>
@@ -2772,7 +2801,7 @@
         <a:buChar char="•"/>
         <a:defRPr sz="1800" kern="1200">
           <a:solidFill>
-            <a:schemeClr val="tx1"/>
+            <a:schemeClr val="bg1"/>
           </a:solidFill>
           <a:latin typeface="+mn-lt"/>
           <a:ea typeface="+mn-ea"/>
@@ -2790,7 +2819,7 @@
         <a:buChar char="•"/>
         <a:defRPr sz="1800" kern="1200">
           <a:solidFill>
-            <a:schemeClr val="tx1"/>
+            <a:schemeClr val="bg1"/>
           </a:solidFill>
           <a:latin typeface="+mn-lt"/>
           <a:ea typeface="+mn-ea"/>
@@ -2997,200 +3026,221 @@
           <a:chExt cx="0" cy="0"/>
         </a:xfrm>
       </p:grpSpPr>
-      <p:sp>
-        <p:nvSpPr>
-          <p:cNvPr id="4" name="타원 3"/>
-          <p:cNvSpPr/>
+      <p:grpSp>
+        <p:nvGrpSpPr>
+          <p:cNvPr id="2" name="그룹 1">
+            <a:extLst>
+              <a:ext uri="{FF2B5EF4-FFF2-40B4-BE49-F238E27FC236}">
+                <a16:creationId xmlns:a16="http://schemas.microsoft.com/office/drawing/2014/main" id="{782876F8-19F2-4266-8AD5-034259A24D5D}"/>
+              </a:ext>
+            </a:extLst>
+          </p:cNvPr>
+          <p:cNvGrpSpPr/>
           <p:nvPr/>
-        </p:nvSpPr>
-        <p:spPr>
-          <a:xfrm>
-            <a:off x="1219201" y="890953"/>
-            <a:ext cx="5040923" cy="4926358"/>
-          </a:xfrm>
-          <a:prstGeom prst="ellipse">
-            <a:avLst/>
-          </a:prstGeom>
-          <a:noFill/>
-          <a:ln w="19050">
-            <a:gradFill>
-              <a:gsLst>
-                <a:gs pos="0">
-                  <a:schemeClr val="accent1">
-                    <a:lumMod val="5000"/>
-                    <a:lumOff val="95000"/>
-                  </a:schemeClr>
-                </a:gs>
-                <a:gs pos="74000">
-                  <a:schemeClr val="accent1">
-                    <a:lumMod val="45000"/>
-                    <a:lumOff val="55000"/>
-                  </a:schemeClr>
-                </a:gs>
-                <a:gs pos="83000">
-                  <a:schemeClr val="accent1">
-                    <a:lumMod val="45000"/>
-                    <a:lumOff val="55000"/>
-                  </a:schemeClr>
-                </a:gs>
-                <a:gs pos="100000">
-                  <a:schemeClr val="accent1">
-                    <a:lumMod val="30000"/>
-                    <a:lumOff val="70000"/>
-                  </a:schemeClr>
-                </a:gs>
-              </a:gsLst>
-              <a:lin ang="5400000" scaled="1"/>
-            </a:gradFill>
-          </a:ln>
-        </p:spPr>
-        <p:style>
-          <a:lnRef idx="2">
-            <a:schemeClr val="accent1">
-              <a:shade val="50000"/>
-            </a:schemeClr>
-          </a:lnRef>
-          <a:fillRef idx="1">
-            <a:schemeClr val="accent1"/>
-          </a:fillRef>
-          <a:effectRef idx="0">
-            <a:schemeClr val="accent1"/>
-          </a:effectRef>
-          <a:fontRef idx="minor">
-            <a:schemeClr val="lt1"/>
-          </a:fontRef>
-        </p:style>
-        <p:txBody>
-          <a:bodyPr rtlCol="0" anchor="ctr"/>
-          <a:lstStyle/>
-          <a:p>
-            <a:pPr algn="ctr"/>
-            <a:endParaRPr lang="en-US" altLang="ko-KR" dirty="0"/>
-          </a:p>
-          <a:p>
-            <a:pPr algn="ctr"/>
-            <a:endParaRPr lang="ko-KR" altLang="en-US" dirty="0"/>
-          </a:p>
-        </p:txBody>
-      </p:sp>
-      <p:sp>
-        <p:nvSpPr>
-          <p:cNvPr id="6" name="타원 5"/>
-          <p:cNvSpPr/>
-          <p:nvPr/>
-        </p:nvSpPr>
-        <p:spPr>
-          <a:xfrm>
-            <a:off x="865294" y="1162981"/>
-            <a:ext cx="5020840" cy="4906731"/>
-          </a:xfrm>
-          <a:prstGeom prst="ellipse">
-            <a:avLst/>
-          </a:prstGeom>
-          <a:noFill/>
-          <a:ln w="19050">
-            <a:gradFill flip="none" rotWithShape="1">
-              <a:gsLst>
-                <a:gs pos="0">
-                  <a:srgbClr val="FFC000">
-                    <a:alpha val="81000"/>
-                  </a:srgbClr>
-                </a:gs>
-                <a:gs pos="100000">
-                  <a:srgbClr val="FF0000">
-                    <a:alpha val="67000"/>
-                  </a:srgbClr>
-                </a:gs>
-              </a:gsLst>
-              <a:lin ang="16200000" scaled="1"/>
-              <a:tileRect/>
-            </a:gradFill>
-          </a:ln>
-        </p:spPr>
-        <p:style>
-          <a:lnRef idx="2">
-            <a:schemeClr val="accent1">
-              <a:shade val="50000"/>
-            </a:schemeClr>
-          </a:lnRef>
-          <a:fillRef idx="1">
-            <a:schemeClr val="accent1"/>
-          </a:fillRef>
-          <a:effectRef idx="0">
-            <a:schemeClr val="accent1"/>
-          </a:effectRef>
-          <a:fontRef idx="minor">
-            <a:schemeClr val="lt1"/>
-          </a:fontRef>
-        </p:style>
-        <p:txBody>
-          <a:bodyPr rtlCol="0" anchor="ctr"/>
-          <a:lstStyle/>
-          <a:p>
-            <a:pPr algn="ctr"/>
-            <a:endParaRPr lang="ko-KR" altLang="en-US" dirty="0"/>
-          </a:p>
-        </p:txBody>
-      </p:sp>
-      <p:sp>
-        <p:nvSpPr>
-          <p:cNvPr id="9" name="타원 8"/>
-          <p:cNvSpPr/>
-          <p:nvPr/>
-        </p:nvSpPr>
-        <p:spPr>
-          <a:xfrm>
-            <a:off x="1438209" y="638907"/>
-            <a:ext cx="4447925" cy="4906731"/>
-          </a:xfrm>
-          <a:prstGeom prst="ellipse">
-            <a:avLst/>
-          </a:prstGeom>
-          <a:noFill/>
-          <a:ln w="19050">
-            <a:gradFill flip="none" rotWithShape="1">
-              <a:gsLst>
-                <a:gs pos="0">
-                  <a:srgbClr val="FFDF79">
-                    <a:alpha val="80784"/>
-                  </a:srgbClr>
-                </a:gs>
-                <a:gs pos="100000">
-                  <a:srgbClr val="FF5B5B">
-                    <a:alpha val="66667"/>
-                  </a:srgbClr>
-                </a:gs>
-              </a:gsLst>
-              <a:lin ang="16200000" scaled="1"/>
-              <a:tileRect/>
-            </a:gradFill>
-          </a:ln>
-        </p:spPr>
-        <p:style>
-          <a:lnRef idx="2">
-            <a:schemeClr val="accent1">
-              <a:shade val="50000"/>
-            </a:schemeClr>
-          </a:lnRef>
-          <a:fillRef idx="1">
-            <a:schemeClr val="accent1"/>
-          </a:fillRef>
-          <a:effectRef idx="0">
-            <a:schemeClr val="accent1"/>
-          </a:effectRef>
-          <a:fontRef idx="minor">
-            <a:schemeClr val="lt1"/>
-          </a:fontRef>
-        </p:style>
-        <p:txBody>
-          <a:bodyPr rtlCol="0" anchor="ctr"/>
-          <a:lstStyle/>
-          <a:p>
-            <a:pPr algn="ctr"/>
-            <a:endParaRPr lang="ko-KR" altLang="en-US" dirty="0"/>
-          </a:p>
-        </p:txBody>
-      </p:sp>
+        </p:nvGrpSpPr>
+        <p:grpSpPr>
+          <a:xfrm>
+            <a:off x="865294" y="638907"/>
+            <a:ext cx="5394830" cy="5430805"/>
+            <a:chOff x="865294" y="638907"/>
+            <a:chExt cx="5394830" cy="5430805"/>
+          </a:xfrm>
+        </p:grpSpPr>
+        <p:sp>
+          <p:nvSpPr>
+            <p:cNvPr id="4" name="타원 3"/>
+            <p:cNvSpPr/>
+            <p:nvPr/>
+          </p:nvSpPr>
+          <p:spPr>
+            <a:xfrm>
+              <a:off x="1219201" y="890953"/>
+              <a:ext cx="5040923" cy="4926358"/>
+            </a:xfrm>
+            <a:prstGeom prst="ellipse">
+              <a:avLst/>
+            </a:prstGeom>
+            <a:noFill/>
+            <a:ln w="19050">
+              <a:gradFill>
+                <a:gsLst>
+                  <a:gs pos="0">
+                    <a:schemeClr val="accent1">
+                      <a:lumMod val="5000"/>
+                      <a:lumOff val="95000"/>
+                    </a:schemeClr>
+                  </a:gs>
+                  <a:gs pos="74000">
+                    <a:schemeClr val="accent1">
+                      <a:lumMod val="45000"/>
+                      <a:lumOff val="55000"/>
+                    </a:schemeClr>
+                  </a:gs>
+                  <a:gs pos="83000">
+                    <a:schemeClr val="accent1">
+                      <a:lumMod val="45000"/>
+                      <a:lumOff val="55000"/>
+                    </a:schemeClr>
+                  </a:gs>
+                  <a:gs pos="100000">
+                    <a:schemeClr val="accent1">
+                      <a:lumMod val="30000"/>
+                      <a:lumOff val="70000"/>
+                    </a:schemeClr>
+                  </a:gs>
+                </a:gsLst>
+                <a:lin ang="5400000" scaled="1"/>
+              </a:gradFill>
+            </a:ln>
+          </p:spPr>
+          <p:style>
+            <a:lnRef idx="2">
+              <a:schemeClr val="accent1">
+                <a:shade val="50000"/>
+              </a:schemeClr>
+            </a:lnRef>
+            <a:fillRef idx="1">
+              <a:schemeClr val="accent1"/>
+            </a:fillRef>
+            <a:effectRef idx="0">
+              <a:schemeClr val="accent1"/>
+            </a:effectRef>
+            <a:fontRef idx="minor">
+              <a:schemeClr val="lt1"/>
+            </a:fontRef>
+          </p:style>
+          <p:txBody>
+            <a:bodyPr rtlCol="0" anchor="ctr"/>
+            <a:lstStyle/>
+            <a:p>
+              <a:pPr algn="ctr"/>
+              <a:endParaRPr lang="en-US" altLang="ko-KR" dirty="0"/>
+            </a:p>
+            <a:p>
+              <a:pPr algn="ctr"/>
+              <a:endParaRPr lang="ko-KR" altLang="en-US" dirty="0"/>
+            </a:p>
+          </p:txBody>
+        </p:sp>
+        <p:sp>
+          <p:nvSpPr>
+            <p:cNvPr id="6" name="타원 5"/>
+            <p:cNvSpPr/>
+            <p:nvPr/>
+          </p:nvSpPr>
+          <p:spPr>
+            <a:xfrm>
+              <a:off x="865294" y="1162981"/>
+              <a:ext cx="5020840" cy="4906731"/>
+            </a:xfrm>
+            <a:prstGeom prst="ellipse">
+              <a:avLst/>
+            </a:prstGeom>
+            <a:noFill/>
+            <a:ln w="19050">
+              <a:gradFill flip="none" rotWithShape="1">
+                <a:gsLst>
+                  <a:gs pos="0">
+                    <a:srgbClr val="FFC000">
+                      <a:alpha val="81000"/>
+                    </a:srgbClr>
+                  </a:gs>
+                  <a:gs pos="100000">
+                    <a:srgbClr val="FF0000">
+                      <a:alpha val="67000"/>
+                    </a:srgbClr>
+                  </a:gs>
+                </a:gsLst>
+                <a:lin ang="16200000" scaled="1"/>
+                <a:tileRect/>
+              </a:gradFill>
+            </a:ln>
+          </p:spPr>
+          <p:style>
+            <a:lnRef idx="2">
+              <a:schemeClr val="accent1">
+                <a:shade val="50000"/>
+              </a:schemeClr>
+            </a:lnRef>
+            <a:fillRef idx="1">
+              <a:schemeClr val="accent1"/>
+            </a:fillRef>
+            <a:effectRef idx="0">
+              <a:schemeClr val="accent1"/>
+            </a:effectRef>
+            <a:fontRef idx="minor">
+              <a:schemeClr val="lt1"/>
+            </a:fontRef>
+          </p:style>
+          <p:txBody>
+            <a:bodyPr rtlCol="0" anchor="ctr"/>
+            <a:lstStyle/>
+            <a:p>
+              <a:pPr algn="ctr"/>
+              <a:endParaRPr lang="ko-KR" altLang="en-US" dirty="0"/>
+            </a:p>
+          </p:txBody>
+        </p:sp>
+        <p:sp>
+          <p:nvSpPr>
+            <p:cNvPr id="9" name="타원 8"/>
+            <p:cNvSpPr/>
+            <p:nvPr/>
+          </p:nvSpPr>
+          <p:spPr>
+            <a:xfrm>
+              <a:off x="1438209" y="638907"/>
+              <a:ext cx="4447925" cy="4906731"/>
+            </a:xfrm>
+            <a:prstGeom prst="ellipse">
+              <a:avLst/>
+            </a:prstGeom>
+            <a:noFill/>
+            <a:ln w="19050">
+              <a:gradFill flip="none" rotWithShape="1">
+                <a:gsLst>
+                  <a:gs pos="0">
+                    <a:srgbClr val="FFDF79">
+                      <a:alpha val="80784"/>
+                    </a:srgbClr>
+                  </a:gs>
+                  <a:gs pos="100000">
+                    <a:srgbClr val="FF5B5B">
+                      <a:alpha val="66667"/>
+                    </a:srgbClr>
+                  </a:gs>
+                </a:gsLst>
+                <a:lin ang="16200000" scaled="1"/>
+                <a:tileRect/>
+              </a:gradFill>
+            </a:ln>
+          </p:spPr>
+          <p:style>
+            <a:lnRef idx="2">
+              <a:schemeClr val="accent1">
+                <a:shade val="50000"/>
+              </a:schemeClr>
+            </a:lnRef>
+            <a:fillRef idx="1">
+              <a:schemeClr val="accent1"/>
+            </a:fillRef>
+            <a:effectRef idx="0">
+              <a:schemeClr val="accent1"/>
+            </a:effectRef>
+            <a:fontRef idx="minor">
+              <a:schemeClr val="lt1"/>
+            </a:fontRef>
+          </p:style>
+          <p:txBody>
+            <a:bodyPr rtlCol="0" anchor="ctr"/>
+            <a:lstStyle/>
+            <a:p>
+              <a:pPr algn="ctr"/>
+              <a:endParaRPr lang="ko-KR" altLang="en-US" dirty="0"/>
+            </a:p>
+          </p:txBody>
+        </p:sp>
+      </p:grpSp>
       <p:sp>
         <p:nvSpPr>
           <p:cNvPr id="11" name="TextBox 10"/>
@@ -3383,6 +3433,154 @@
           <a:chExt cx="0" cy="0"/>
         </a:xfrm>
       </p:grpSpPr>
+      <p:pic>
+        <p:nvPicPr>
+          <p:cNvPr id="43" name="그림 42">
+            <a:extLst>
+              <a:ext uri="{FF2B5EF4-FFF2-40B4-BE49-F238E27FC236}">
+                <a16:creationId xmlns:a16="http://schemas.microsoft.com/office/drawing/2014/main" id="{BEBAC2EE-C006-4F8B-976F-ACF769FEE006}"/>
+              </a:ext>
+            </a:extLst>
+          </p:cNvPr>
+          <p:cNvPicPr>
+            <a:picLocks noChangeAspect="1"/>
+          </p:cNvPicPr>
+          <p:nvPr/>
+        </p:nvPicPr>
+        <p:blipFill>
+          <a:blip r:embed="rId3">
+            <a:extLst>
+              <a:ext uri="{28A0092B-C50C-407E-A947-70E740481C1C}">
+                <a14:useLocalDpi xmlns:a14="http://schemas.microsoft.com/office/drawing/2010/main" val="0"/>
+              </a:ext>
+            </a:extLst>
+          </a:blip>
+          <a:stretch>
+            <a:fillRect/>
+          </a:stretch>
+        </p:blipFill>
+        <p:spPr>
+          <a:xfrm rot="18872706">
+            <a:off x="4840291" y="3063733"/>
+            <a:ext cx="798000" cy="828000"/>
+          </a:xfrm>
+          <a:prstGeom prst="rect">
+            <a:avLst/>
+          </a:prstGeom>
+        </p:spPr>
+      </p:pic>
+      <p:sp>
+        <p:nvSpPr>
+          <p:cNvPr id="42" name="직사각형 41">
+            <a:extLst>
+              <a:ext uri="{FF2B5EF4-FFF2-40B4-BE49-F238E27FC236}">
+                <a16:creationId xmlns:a16="http://schemas.microsoft.com/office/drawing/2014/main" id="{CF35418B-D629-491F-89F5-D666E23C5A3A}"/>
+              </a:ext>
+            </a:extLst>
+          </p:cNvPr>
+          <p:cNvSpPr/>
+          <p:nvPr/>
+        </p:nvSpPr>
+        <p:spPr>
+          <a:xfrm>
+            <a:off x="6374621" y="3065287"/>
+            <a:ext cx="798990" cy="803649"/>
+          </a:xfrm>
+          <a:prstGeom prst="rect">
+            <a:avLst/>
+          </a:prstGeom>
+          <a:pattFill prst="wdDnDiag">
+            <a:fgClr>
+              <a:schemeClr val="accent4"/>
+            </a:fgClr>
+            <a:bgClr>
+              <a:schemeClr val="accent4">
+                <a:lumMod val="50000"/>
+              </a:schemeClr>
+            </a:bgClr>
+          </a:pattFill>
+        </p:spPr>
+        <p:style>
+          <a:lnRef idx="2">
+            <a:schemeClr val="accent1">
+              <a:shade val="50000"/>
+            </a:schemeClr>
+          </a:lnRef>
+          <a:fillRef idx="1">
+            <a:schemeClr val="accent1"/>
+          </a:fillRef>
+          <a:effectRef idx="0">
+            <a:schemeClr val="accent1"/>
+          </a:effectRef>
+          <a:fontRef idx="minor">
+            <a:schemeClr val="lt1"/>
+          </a:fontRef>
+        </p:style>
+        <p:txBody>
+          <a:bodyPr rtlCol="0" anchor="ctr"/>
+          <a:lstStyle/>
+          <a:p>
+            <a:pPr algn="ctr"/>
+            <a:endParaRPr lang="ko-KR" altLang="en-US"/>
+          </a:p>
+        </p:txBody>
+      </p:sp>
+      <p:sp>
+        <p:nvSpPr>
+          <p:cNvPr id="10" name="직사각형 9">
+            <a:extLst>
+              <a:ext uri="{FF2B5EF4-FFF2-40B4-BE49-F238E27FC236}">
+                <a16:creationId xmlns:a16="http://schemas.microsoft.com/office/drawing/2014/main" id="{BFBB1470-A95D-457F-8C59-E1598C10E6ED}"/>
+              </a:ext>
+            </a:extLst>
+          </p:cNvPr>
+          <p:cNvSpPr/>
+          <p:nvPr/>
+        </p:nvSpPr>
+        <p:spPr>
+          <a:xfrm>
+            <a:off x="1976800" y="2899695"/>
+            <a:ext cx="1124403" cy="1137304"/>
+          </a:xfrm>
+          <a:prstGeom prst="rect">
+            <a:avLst/>
+          </a:prstGeom>
+          <a:pattFill prst="wdDnDiag">
+            <a:fgClr>
+              <a:schemeClr val="accent4"/>
+            </a:fgClr>
+            <a:bgClr>
+              <a:schemeClr val="accent4">
+                <a:lumMod val="50000"/>
+              </a:schemeClr>
+            </a:bgClr>
+          </a:pattFill>
+        </p:spPr>
+        <p:style>
+          <a:lnRef idx="2">
+            <a:schemeClr val="accent1">
+              <a:shade val="50000"/>
+            </a:schemeClr>
+          </a:lnRef>
+          <a:fillRef idx="1">
+            <a:schemeClr val="accent1"/>
+          </a:fillRef>
+          <a:effectRef idx="0">
+            <a:schemeClr val="accent1"/>
+          </a:effectRef>
+          <a:fontRef idx="minor">
+            <a:schemeClr val="lt1"/>
+          </a:fontRef>
+        </p:style>
+        <p:txBody>
+          <a:bodyPr rtlCol="0" anchor="ctr"/>
+          <a:lstStyle/>
+          <a:p>
+            <a:pPr algn="ctr"/>
+            <a:endParaRPr lang="ko-KR" altLang="en-US" dirty="0"/>
+          </a:p>
+        </p:txBody>
+      </p:sp>
       <p:sp>
         <p:nvSpPr>
           <p:cNvPr id="3" name="내용 개체 틀 2">
@@ -3899,152 +4097,174 @@
           </p:style>
         </p:cxnSp>
       </p:grpSp>
-      <p:sp>
-        <p:nvSpPr>
-          <p:cNvPr id="16" name="별: 꼭짓점 6개 15">
+      <p:grpSp>
+        <p:nvGrpSpPr>
+          <p:cNvPr id="15" name="그룹 14">
             <a:extLst>
               <a:ext uri="{FF2B5EF4-FFF2-40B4-BE49-F238E27FC236}">
-                <a16:creationId xmlns:a16="http://schemas.microsoft.com/office/drawing/2014/main" id="{286C5129-E368-47FA-A914-1DEABE0F7EC7}"/>
+                <a16:creationId xmlns:a16="http://schemas.microsoft.com/office/drawing/2014/main" id="{437F54AE-1B8F-4983-9373-EDB18F4A3B6E}"/>
               </a:ext>
             </a:extLst>
           </p:cNvPr>
-          <p:cNvSpPr/>
+          <p:cNvGrpSpPr/>
           <p:nvPr/>
-        </p:nvSpPr>
-        <p:spPr>
-          <a:xfrm rot="2747528">
-            <a:off x="2163447" y="3188225"/>
-            <a:ext cx="772357" cy="621437"/>
-          </a:xfrm>
-          <a:prstGeom prst="star6">
-            <a:avLst/>
-          </a:prstGeom>
-          <a:solidFill>
-            <a:schemeClr val="accent1"/>
-          </a:solidFill>
-          <a:ln>
+        </p:nvGrpSpPr>
+        <p:grpSpPr>
+          <a:xfrm>
+            <a:off x="2139519" y="3081489"/>
+            <a:ext cx="819611" cy="828000"/>
+            <a:chOff x="2139519" y="3081489"/>
+            <a:chExt cx="819611" cy="828000"/>
+          </a:xfrm>
+        </p:grpSpPr>
+        <p:sp>
+          <p:nvSpPr>
+            <p:cNvPr id="16" name="별: 꼭짓점 6개 15">
+              <a:extLst>
+                <a:ext uri="{FF2B5EF4-FFF2-40B4-BE49-F238E27FC236}">
+                  <a16:creationId xmlns:a16="http://schemas.microsoft.com/office/drawing/2014/main" id="{286C5129-E368-47FA-A914-1DEABE0F7EC7}"/>
+                </a:ext>
+              </a:extLst>
+            </p:cNvPr>
+            <p:cNvSpPr/>
+            <p:nvPr/>
+          </p:nvSpPr>
+          <p:spPr>
+            <a:xfrm rot="2747528">
+              <a:off x="2163447" y="3188225"/>
+              <a:ext cx="772357" cy="621437"/>
+            </a:xfrm>
+            <a:prstGeom prst="star6">
+              <a:avLst/>
+            </a:prstGeom>
             <a:solidFill>
+              <a:schemeClr val="accent1"/>
+            </a:solidFill>
+            <a:ln>
+              <a:solidFill>
+                <a:schemeClr val="accent1">
+                  <a:alpha val="25000"/>
+                </a:schemeClr>
+              </a:solidFill>
+            </a:ln>
+          </p:spPr>
+          <p:style>
+            <a:lnRef idx="2">
               <a:schemeClr val="accent1">
-                <a:alpha val="25000"/>
+                <a:shade val="50000"/>
               </a:schemeClr>
-            </a:solidFill>
-          </a:ln>
-        </p:spPr>
-        <p:style>
-          <a:lnRef idx="2">
-            <a:schemeClr val="accent1">
-              <a:shade val="50000"/>
-            </a:schemeClr>
-          </a:lnRef>
-          <a:fillRef idx="1">
-            <a:schemeClr val="accent1"/>
-          </a:fillRef>
-          <a:effectRef idx="0">
-            <a:schemeClr val="accent1"/>
-          </a:effectRef>
-          <a:fontRef idx="minor">
-            <a:schemeClr val="lt1"/>
-          </a:fontRef>
-        </p:style>
-        <p:txBody>
-          <a:bodyPr rtlCol="0" anchor="ctr"/>
-          <a:lstStyle/>
-          <a:p>
-            <a:pPr algn="ctr"/>
-            <a:endParaRPr lang="ko-KR" altLang="en-US"/>
-          </a:p>
-        </p:txBody>
-      </p:sp>
-      <p:cxnSp>
-        <p:nvCxnSpPr>
-          <p:cNvPr id="17" name="직선 연결선 16">
-            <a:extLst>
-              <a:ext uri="{FF2B5EF4-FFF2-40B4-BE49-F238E27FC236}">
-                <a16:creationId xmlns:a16="http://schemas.microsoft.com/office/drawing/2014/main" id="{B7610B36-952C-4C34-A4D1-3FD31B34E3A1}"/>
-              </a:ext>
-            </a:extLst>
-          </p:cNvPr>
-          <p:cNvCxnSpPr>
-            <a:cxnSpLocks/>
-          </p:cNvCxnSpPr>
-          <p:nvPr/>
-        </p:nvCxnSpPr>
-        <p:spPr>
-          <a:xfrm rot="2747528" flipV="1">
-            <a:off x="2714994" y="3100143"/>
-            <a:ext cx="0" cy="488272"/>
-          </a:xfrm>
-          <a:prstGeom prst="line">
-            <a:avLst/>
-          </a:prstGeom>
-          <a:ln>
-            <a:solidFill>
-              <a:schemeClr val="bg1"/>
-            </a:solidFill>
-          </a:ln>
-        </p:spPr>
-        <p:style>
-          <a:lnRef idx="1">
-            <a:schemeClr val="accent1"/>
-          </a:lnRef>
-          <a:fillRef idx="0">
-            <a:schemeClr val="accent1"/>
-          </a:fillRef>
-          <a:effectRef idx="0">
-            <a:schemeClr val="accent1"/>
-          </a:effectRef>
-          <a:fontRef idx="minor">
-            <a:schemeClr val="tx1"/>
-          </a:fontRef>
-        </p:style>
-      </p:cxnSp>
-      <p:sp>
-        <p:nvSpPr>
-          <p:cNvPr id="18" name="직사각형 17">
-            <a:extLst>
-              <a:ext uri="{FF2B5EF4-FFF2-40B4-BE49-F238E27FC236}">
-                <a16:creationId xmlns:a16="http://schemas.microsoft.com/office/drawing/2014/main" id="{52CEC46F-23CF-4862-9CB5-D9D0E8908913}"/>
-              </a:ext>
-            </a:extLst>
-          </p:cNvPr>
-          <p:cNvSpPr/>
-          <p:nvPr/>
-        </p:nvSpPr>
-        <p:spPr>
-          <a:xfrm>
-            <a:off x="2139519" y="3081489"/>
-            <a:ext cx="798990" cy="828000"/>
-          </a:xfrm>
-          <a:prstGeom prst="rect">
-            <a:avLst/>
-          </a:prstGeom>
-          <a:noFill/>
-        </p:spPr>
-        <p:style>
-          <a:lnRef idx="2">
-            <a:schemeClr val="accent1">
-              <a:shade val="50000"/>
-            </a:schemeClr>
-          </a:lnRef>
-          <a:fillRef idx="1">
-            <a:schemeClr val="accent1"/>
-          </a:fillRef>
-          <a:effectRef idx="0">
-            <a:schemeClr val="accent1"/>
-          </a:effectRef>
-          <a:fontRef idx="minor">
-            <a:schemeClr val="lt1"/>
-          </a:fontRef>
-        </p:style>
-        <p:txBody>
-          <a:bodyPr rtlCol="0" anchor="ctr"/>
-          <a:lstStyle/>
-          <a:p>
-            <a:pPr algn="ctr"/>
-            <a:endParaRPr lang="ko-KR" altLang="en-US"/>
-          </a:p>
-        </p:txBody>
-      </p:sp>
+            </a:lnRef>
+            <a:fillRef idx="1">
+              <a:schemeClr val="accent1"/>
+            </a:fillRef>
+            <a:effectRef idx="0">
+              <a:schemeClr val="accent1"/>
+            </a:effectRef>
+            <a:fontRef idx="minor">
+              <a:schemeClr val="lt1"/>
+            </a:fontRef>
+          </p:style>
+          <p:txBody>
+            <a:bodyPr rtlCol="0" anchor="ctr"/>
+            <a:lstStyle/>
+            <a:p>
+              <a:pPr algn="ctr"/>
+              <a:endParaRPr lang="ko-KR" altLang="en-US" dirty="0"/>
+            </a:p>
+          </p:txBody>
+        </p:sp>
+        <p:cxnSp>
+          <p:nvCxnSpPr>
+            <p:cNvPr id="17" name="직선 연결선 16">
+              <a:extLst>
+                <a:ext uri="{FF2B5EF4-FFF2-40B4-BE49-F238E27FC236}">
+                  <a16:creationId xmlns:a16="http://schemas.microsoft.com/office/drawing/2014/main" id="{B7610B36-952C-4C34-A4D1-3FD31B34E3A1}"/>
+                </a:ext>
+              </a:extLst>
+            </p:cNvPr>
+            <p:cNvCxnSpPr>
+              <a:cxnSpLocks/>
+            </p:cNvCxnSpPr>
+            <p:nvPr/>
+          </p:nvCxnSpPr>
+          <p:spPr>
+            <a:xfrm rot="2747528" flipV="1">
+              <a:off x="2714994" y="3100143"/>
+              <a:ext cx="0" cy="488272"/>
+            </a:xfrm>
+            <a:prstGeom prst="line">
+              <a:avLst/>
+            </a:prstGeom>
+            <a:ln>
+              <a:solidFill>
+                <a:schemeClr val="bg1"/>
+              </a:solidFill>
+            </a:ln>
+          </p:spPr>
+          <p:style>
+            <a:lnRef idx="1">
+              <a:schemeClr val="accent1"/>
+            </a:lnRef>
+            <a:fillRef idx="0">
+              <a:schemeClr val="accent1"/>
+            </a:fillRef>
+            <a:effectRef idx="0">
+              <a:schemeClr val="accent1"/>
+            </a:effectRef>
+            <a:fontRef idx="minor">
+              <a:schemeClr val="tx1"/>
+            </a:fontRef>
+          </p:style>
+        </p:cxnSp>
+        <p:sp>
+          <p:nvSpPr>
+            <p:cNvPr id="18" name="직사각형 17">
+              <a:extLst>
+                <a:ext uri="{FF2B5EF4-FFF2-40B4-BE49-F238E27FC236}">
+                  <a16:creationId xmlns:a16="http://schemas.microsoft.com/office/drawing/2014/main" id="{52CEC46F-23CF-4862-9CB5-D9D0E8908913}"/>
+                </a:ext>
+              </a:extLst>
+            </p:cNvPr>
+            <p:cNvSpPr/>
+            <p:nvPr/>
+          </p:nvSpPr>
+          <p:spPr>
+            <a:xfrm>
+              <a:off x="2139519" y="3081489"/>
+              <a:ext cx="798990" cy="828000"/>
+            </a:xfrm>
+            <a:prstGeom prst="rect">
+              <a:avLst/>
+            </a:prstGeom>
+            <a:noFill/>
+            <a:ln w="38100"/>
+          </p:spPr>
+          <p:style>
+            <a:lnRef idx="2">
+              <a:schemeClr val="accent1">
+                <a:shade val="50000"/>
+              </a:schemeClr>
+            </a:lnRef>
+            <a:fillRef idx="1">
+              <a:schemeClr val="accent1"/>
+            </a:fillRef>
+            <a:effectRef idx="0">
+              <a:schemeClr val="accent1"/>
+            </a:effectRef>
+            <a:fontRef idx="minor">
+              <a:schemeClr val="lt1"/>
+            </a:fontRef>
+          </p:style>
+          <p:txBody>
+            <a:bodyPr rtlCol="0" anchor="ctr"/>
+            <a:lstStyle/>
+            <a:p>
+              <a:pPr algn="ctr"/>
+              <a:endParaRPr lang="ko-KR" altLang="en-US" dirty="0"/>
+            </a:p>
+          </p:txBody>
+        </p:sp>
+      </p:grpSp>
       <p:grpSp>
         <p:nvGrpSpPr>
           <p:cNvPr id="21" name="그룹 20">
@@ -4309,14 +4529,14 @@
             </a:prstGeom>
             <a:solidFill>
               <a:schemeClr val="accent1">
-                <a:alpha val="25000"/>
+                <a:alpha val="50000"/>
               </a:schemeClr>
             </a:solidFill>
             <a:ln>
               <a:solidFill>
                 <a:schemeClr val="accent1">
                   <a:shade val="50000"/>
-                  <a:alpha val="25000"/>
+                  <a:alpha val="50000"/>
                 </a:schemeClr>
               </a:solidFill>
             </a:ln>
@@ -4347,261 +4567,6 @@
           </p:txBody>
         </p:sp>
       </p:grpSp>
-      <p:grpSp>
-        <p:nvGrpSpPr>
-          <p:cNvPr id="52" name="그룹 51">
-            <a:extLst>
-              <a:ext uri="{FF2B5EF4-FFF2-40B4-BE49-F238E27FC236}">
-                <a16:creationId xmlns:a16="http://schemas.microsoft.com/office/drawing/2014/main" id="{029CEF3C-1F3D-4898-95E4-A222DBF8D8B1}"/>
-              </a:ext>
-            </a:extLst>
-          </p:cNvPr>
-          <p:cNvGrpSpPr/>
-          <p:nvPr/>
-        </p:nvGrpSpPr>
-        <p:grpSpPr>
-          <a:xfrm>
-            <a:off x="6391268" y="3028223"/>
-            <a:ext cx="852690" cy="852980"/>
-            <a:chOff x="5994079" y="3036992"/>
-            <a:chExt cx="852690" cy="852980"/>
-          </a:xfrm>
-        </p:grpSpPr>
-        <p:grpSp>
-          <p:nvGrpSpPr>
-            <p:cNvPr id="36" name="그룹 35">
-              <a:extLst>
-                <a:ext uri="{FF2B5EF4-FFF2-40B4-BE49-F238E27FC236}">
-                  <a16:creationId xmlns:a16="http://schemas.microsoft.com/office/drawing/2014/main" id="{127A34A9-5363-478E-83DF-CD8BE79A6024}"/>
-                </a:ext>
-              </a:extLst>
-            </p:cNvPr>
-            <p:cNvGrpSpPr/>
-            <p:nvPr/>
-          </p:nvGrpSpPr>
-          <p:grpSpPr>
-            <a:xfrm rot="30795">
-              <a:off x="5994079" y="3061972"/>
-              <a:ext cx="819611" cy="828000"/>
-              <a:chOff x="1883546" y="3180623"/>
-              <a:chExt cx="819611" cy="828000"/>
-            </a:xfrm>
-          </p:grpSpPr>
-          <p:cxnSp>
-            <p:nvCxnSpPr>
-              <p:cNvPr id="37" name="직선 연결선 36">
-                <a:extLst>
-                  <a:ext uri="{FF2B5EF4-FFF2-40B4-BE49-F238E27FC236}">
-                    <a16:creationId xmlns:a16="http://schemas.microsoft.com/office/drawing/2014/main" id="{E65E95DA-1DBB-4671-ABA4-F1BD81A6B954}"/>
-                  </a:ext>
-                </a:extLst>
-              </p:cNvPr>
-              <p:cNvCxnSpPr>
-                <a:cxnSpLocks/>
-              </p:cNvCxnSpPr>
-              <p:nvPr/>
-            </p:nvCxnSpPr>
-            <p:spPr>
-              <a:xfrm rot="2747528" flipV="1">
-                <a:off x="2459021" y="3199277"/>
-                <a:ext cx="0" cy="488272"/>
-              </a:xfrm>
-              <a:prstGeom prst="line">
-                <a:avLst/>
-              </a:prstGeom>
-              <a:ln>
-                <a:solidFill>
-                  <a:schemeClr val="bg1"/>
-                </a:solidFill>
-              </a:ln>
-            </p:spPr>
-            <p:style>
-              <a:lnRef idx="1">
-                <a:schemeClr val="accent1"/>
-              </a:lnRef>
-              <a:fillRef idx="0">
-                <a:schemeClr val="accent1"/>
-              </a:fillRef>
-              <a:effectRef idx="0">
-                <a:schemeClr val="accent1"/>
-              </a:effectRef>
-              <a:fontRef idx="minor">
-                <a:schemeClr val="tx1"/>
-              </a:fontRef>
-            </p:style>
-          </p:cxnSp>
-          <p:sp>
-            <p:nvSpPr>
-              <p:cNvPr id="38" name="직사각형 37">
-                <a:extLst>
-                  <a:ext uri="{FF2B5EF4-FFF2-40B4-BE49-F238E27FC236}">
-                    <a16:creationId xmlns:a16="http://schemas.microsoft.com/office/drawing/2014/main" id="{2515B3EC-FC51-42D0-ACFA-173F9EAEFB3C}"/>
-                  </a:ext>
-                </a:extLst>
-              </p:cNvPr>
-              <p:cNvSpPr/>
-              <p:nvPr/>
-            </p:nvSpPr>
-            <p:spPr>
-              <a:xfrm>
-                <a:off x="1883546" y="3180623"/>
-                <a:ext cx="798990" cy="828000"/>
-              </a:xfrm>
-              <a:prstGeom prst="rect">
-                <a:avLst/>
-              </a:prstGeom>
-              <a:noFill/>
-            </p:spPr>
-            <p:style>
-              <a:lnRef idx="2">
-                <a:schemeClr val="accent1">
-                  <a:shade val="50000"/>
-                </a:schemeClr>
-              </a:lnRef>
-              <a:fillRef idx="1">
-                <a:schemeClr val="accent1"/>
-              </a:fillRef>
-              <a:effectRef idx="0">
-                <a:schemeClr val="accent1"/>
-              </a:effectRef>
-              <a:fontRef idx="minor">
-                <a:schemeClr val="lt1"/>
-              </a:fontRef>
-            </p:style>
-            <p:txBody>
-              <a:bodyPr rtlCol="0" anchor="ctr"/>
-              <a:lstStyle/>
-              <a:p>
-                <a:pPr algn="ctr"/>
-                <a:endParaRPr lang="ko-KR" altLang="en-US"/>
-              </a:p>
-            </p:txBody>
-          </p:sp>
-        </p:grpSp>
-        <p:grpSp>
-          <p:nvGrpSpPr>
-            <p:cNvPr id="39" name="그룹 38">
-              <a:extLst>
-                <a:ext uri="{FF2B5EF4-FFF2-40B4-BE49-F238E27FC236}">
-                  <a16:creationId xmlns:a16="http://schemas.microsoft.com/office/drawing/2014/main" id="{B67C2226-CD33-4E03-9CFB-7F61898B298B}"/>
-                </a:ext>
-              </a:extLst>
-            </p:cNvPr>
-            <p:cNvGrpSpPr/>
-            <p:nvPr/>
-          </p:nvGrpSpPr>
-          <p:grpSpPr>
-            <a:xfrm rot="2766788">
-              <a:off x="6069973" y="3032553"/>
-              <a:ext cx="772357" cy="781235"/>
-              <a:chOff x="1722267" y="3124940"/>
-              <a:chExt cx="772357" cy="781235"/>
-            </a:xfrm>
-          </p:grpSpPr>
-          <p:sp>
-            <p:nvSpPr>
-              <p:cNvPr id="40" name="별: 꼭짓점 6개 39">
-                <a:extLst>
-                  <a:ext uri="{FF2B5EF4-FFF2-40B4-BE49-F238E27FC236}">
-                    <a16:creationId xmlns:a16="http://schemas.microsoft.com/office/drawing/2014/main" id="{30E463DF-80AF-459B-9164-72D1E63458DB}"/>
-                  </a:ext>
-                </a:extLst>
-              </p:cNvPr>
-              <p:cNvSpPr/>
-              <p:nvPr/>
-            </p:nvSpPr>
-            <p:spPr>
-              <a:xfrm>
-                <a:off x="1722267" y="3284738"/>
-                <a:ext cx="772357" cy="621437"/>
-              </a:xfrm>
-              <a:prstGeom prst="star6">
-                <a:avLst/>
-              </a:prstGeom>
-              <a:solidFill>
-                <a:schemeClr val="accent1">
-                  <a:alpha val="25000"/>
-                </a:schemeClr>
-              </a:solidFill>
-              <a:ln>
-                <a:solidFill>
-                  <a:schemeClr val="accent1">
-                    <a:shade val="50000"/>
-                    <a:alpha val="25000"/>
-                  </a:schemeClr>
-                </a:solidFill>
-              </a:ln>
-            </p:spPr>
-            <p:style>
-              <a:lnRef idx="2">
-                <a:schemeClr val="accent1">
-                  <a:shade val="50000"/>
-                </a:schemeClr>
-              </a:lnRef>
-              <a:fillRef idx="1">
-                <a:schemeClr val="accent1"/>
-              </a:fillRef>
-              <a:effectRef idx="0">
-                <a:schemeClr val="accent1"/>
-              </a:effectRef>
-              <a:fontRef idx="minor">
-                <a:schemeClr val="lt1"/>
-              </a:fontRef>
-            </p:style>
-            <p:txBody>
-              <a:bodyPr rtlCol="0" anchor="ctr"/>
-              <a:lstStyle/>
-              <a:p>
-                <a:pPr algn="ctr"/>
-                <a:endParaRPr lang="ko-KR" altLang="en-US"/>
-              </a:p>
-            </p:txBody>
-          </p:sp>
-          <p:cxnSp>
-            <p:nvCxnSpPr>
-              <p:cNvPr id="41" name="직선 연결선 40">
-                <a:extLst>
-                  <a:ext uri="{FF2B5EF4-FFF2-40B4-BE49-F238E27FC236}">
-                    <a16:creationId xmlns:a16="http://schemas.microsoft.com/office/drawing/2014/main" id="{AF8DC8A5-43E5-4CFF-9486-46BAC6D984DC}"/>
-                  </a:ext>
-                </a:extLst>
-              </p:cNvPr>
-              <p:cNvCxnSpPr>
-                <a:cxnSpLocks/>
-              </p:cNvCxnSpPr>
-              <p:nvPr/>
-            </p:nvCxnSpPr>
-            <p:spPr>
-              <a:xfrm flipV="1">
-                <a:off x="2112885" y="3124940"/>
-                <a:ext cx="0" cy="488272"/>
-              </a:xfrm>
-              <a:prstGeom prst="line">
-                <a:avLst/>
-              </a:prstGeom>
-              <a:ln>
-                <a:solidFill>
-                  <a:schemeClr val="bg1"/>
-                </a:solidFill>
-              </a:ln>
-            </p:spPr>
-            <p:style>
-              <a:lnRef idx="1">
-                <a:schemeClr val="accent1"/>
-              </a:lnRef>
-              <a:fillRef idx="0">
-                <a:schemeClr val="accent1"/>
-              </a:fillRef>
-              <a:effectRef idx="0">
-                <a:schemeClr val="accent1"/>
-              </a:effectRef>
-              <a:fontRef idx="minor">
-                <a:schemeClr val="tx1"/>
-              </a:fontRef>
-            </p:style>
-          </p:cxnSp>
-        </p:grpSp>
-      </p:grpSp>
       <p:sp>
         <p:nvSpPr>
           <p:cNvPr id="46" name="TextBox 45">
@@ -4930,6 +4895,267 @@
               </a:rPr>
               <a:t>회전</a:t>
             </a:r>
+          </a:p>
+        </p:txBody>
+      </p:sp>
+      <p:pic>
+        <p:nvPicPr>
+          <p:cNvPr id="13" name="그림 12">
+            <a:extLst>
+              <a:ext uri="{FF2B5EF4-FFF2-40B4-BE49-F238E27FC236}">
+                <a16:creationId xmlns:a16="http://schemas.microsoft.com/office/drawing/2014/main" id="{1914EE3E-919D-48CF-9C95-0E28DDD1D494}"/>
+              </a:ext>
+            </a:extLst>
+          </p:cNvPr>
+          <p:cNvPicPr>
+            <a:picLocks noChangeAspect="1"/>
+          </p:cNvPicPr>
+          <p:nvPr/>
+        </p:nvPicPr>
+        <p:blipFill>
+          <a:blip r:embed="rId3">
+            <a:extLst>
+              <a:ext uri="{28A0092B-C50C-407E-A947-70E740481C1C}">
+                <a14:useLocalDpi xmlns:a14="http://schemas.microsoft.com/office/drawing/2010/main" val="0"/>
+              </a:ext>
+            </a:extLst>
+          </a:blip>
+          <a:stretch>
+            <a:fillRect/>
+          </a:stretch>
+        </p:blipFill>
+        <p:spPr>
+          <a:xfrm rot="18872706">
+            <a:off x="3428849" y="3063733"/>
+            <a:ext cx="798000" cy="828000"/>
+          </a:xfrm>
+          <a:prstGeom prst="rect">
+            <a:avLst/>
+          </a:prstGeom>
+        </p:spPr>
+      </p:pic>
+      <p:grpSp>
+        <p:nvGrpSpPr>
+          <p:cNvPr id="45" name="그룹 44">
+            <a:extLst>
+              <a:ext uri="{FF2B5EF4-FFF2-40B4-BE49-F238E27FC236}">
+                <a16:creationId xmlns:a16="http://schemas.microsoft.com/office/drawing/2014/main" id="{FA502E16-8151-45F0-AE72-226AF8AD36E6}"/>
+              </a:ext>
+            </a:extLst>
+          </p:cNvPr>
+          <p:cNvGrpSpPr/>
+          <p:nvPr/>
+        </p:nvGrpSpPr>
+        <p:grpSpPr>
+          <a:xfrm>
+            <a:off x="6372794" y="3054855"/>
+            <a:ext cx="819611" cy="828000"/>
+            <a:chOff x="2139519" y="3081489"/>
+            <a:chExt cx="819611" cy="828000"/>
+          </a:xfrm>
+        </p:grpSpPr>
+        <p:sp>
+          <p:nvSpPr>
+            <p:cNvPr id="47" name="별: 꼭짓점 6개 46">
+              <a:extLst>
+                <a:ext uri="{FF2B5EF4-FFF2-40B4-BE49-F238E27FC236}">
+                  <a16:creationId xmlns:a16="http://schemas.microsoft.com/office/drawing/2014/main" id="{CD7B4C8E-0BC1-4501-970B-633693E2F718}"/>
+                </a:ext>
+              </a:extLst>
+            </p:cNvPr>
+            <p:cNvSpPr/>
+            <p:nvPr/>
+          </p:nvSpPr>
+          <p:spPr>
+            <a:xfrm rot="2747528">
+              <a:off x="2163447" y="3188225"/>
+              <a:ext cx="772357" cy="621437"/>
+            </a:xfrm>
+            <a:prstGeom prst="star6">
+              <a:avLst/>
+            </a:prstGeom>
+            <a:solidFill>
+              <a:schemeClr val="accent1">
+                <a:alpha val="50000"/>
+              </a:schemeClr>
+            </a:solidFill>
+            <a:ln>
+              <a:solidFill>
+                <a:schemeClr val="accent1">
+                  <a:alpha val="50000"/>
+                </a:schemeClr>
+              </a:solidFill>
+            </a:ln>
+          </p:spPr>
+          <p:style>
+            <a:lnRef idx="2">
+              <a:schemeClr val="accent1">
+                <a:shade val="50000"/>
+              </a:schemeClr>
+            </a:lnRef>
+            <a:fillRef idx="1">
+              <a:schemeClr val="accent1"/>
+            </a:fillRef>
+            <a:effectRef idx="0">
+              <a:schemeClr val="accent1"/>
+            </a:effectRef>
+            <a:fontRef idx="minor">
+              <a:schemeClr val="lt1"/>
+            </a:fontRef>
+          </p:style>
+          <p:txBody>
+            <a:bodyPr rtlCol="0" anchor="ctr"/>
+            <a:lstStyle/>
+            <a:p>
+              <a:pPr algn="ctr"/>
+              <a:endParaRPr lang="ko-KR" altLang="en-US" dirty="0"/>
+            </a:p>
+          </p:txBody>
+        </p:sp>
+        <p:cxnSp>
+          <p:nvCxnSpPr>
+            <p:cNvPr id="54" name="직선 연결선 53">
+              <a:extLst>
+                <a:ext uri="{FF2B5EF4-FFF2-40B4-BE49-F238E27FC236}">
+                  <a16:creationId xmlns:a16="http://schemas.microsoft.com/office/drawing/2014/main" id="{4FC1A790-9FC4-42F5-9DE3-614567755C85}"/>
+                </a:ext>
+              </a:extLst>
+            </p:cNvPr>
+            <p:cNvCxnSpPr>
+              <a:cxnSpLocks/>
+            </p:cNvCxnSpPr>
+            <p:nvPr/>
+          </p:nvCxnSpPr>
+          <p:spPr>
+            <a:xfrm rot="2747528" flipV="1">
+              <a:off x="2714994" y="3100143"/>
+              <a:ext cx="0" cy="488272"/>
+            </a:xfrm>
+            <a:prstGeom prst="line">
+              <a:avLst/>
+            </a:prstGeom>
+            <a:ln>
+              <a:solidFill>
+                <a:schemeClr val="bg1"/>
+              </a:solidFill>
+            </a:ln>
+          </p:spPr>
+          <p:style>
+            <a:lnRef idx="1">
+              <a:schemeClr val="accent1"/>
+            </a:lnRef>
+            <a:fillRef idx="0">
+              <a:schemeClr val="accent1"/>
+            </a:fillRef>
+            <a:effectRef idx="0">
+              <a:schemeClr val="accent1"/>
+            </a:effectRef>
+            <a:fontRef idx="minor">
+              <a:schemeClr val="tx1"/>
+            </a:fontRef>
+          </p:style>
+        </p:cxnSp>
+        <p:sp>
+          <p:nvSpPr>
+            <p:cNvPr id="55" name="직사각형 54">
+              <a:extLst>
+                <a:ext uri="{FF2B5EF4-FFF2-40B4-BE49-F238E27FC236}">
+                  <a16:creationId xmlns:a16="http://schemas.microsoft.com/office/drawing/2014/main" id="{E5D7211C-FBA9-4357-8876-51B0E2B069BF}"/>
+                </a:ext>
+              </a:extLst>
+            </p:cNvPr>
+            <p:cNvSpPr/>
+            <p:nvPr/>
+          </p:nvSpPr>
+          <p:spPr>
+            <a:xfrm>
+              <a:off x="2139519" y="3081489"/>
+              <a:ext cx="798990" cy="828000"/>
+            </a:xfrm>
+            <a:prstGeom prst="rect">
+              <a:avLst/>
+            </a:prstGeom>
+            <a:noFill/>
+          </p:spPr>
+          <p:style>
+            <a:lnRef idx="2">
+              <a:schemeClr val="accent1">
+                <a:shade val="50000"/>
+              </a:schemeClr>
+            </a:lnRef>
+            <a:fillRef idx="1">
+              <a:schemeClr val="accent1"/>
+            </a:fillRef>
+            <a:effectRef idx="0">
+              <a:schemeClr val="accent1"/>
+            </a:effectRef>
+            <a:fontRef idx="minor">
+              <a:schemeClr val="lt1"/>
+            </a:fontRef>
+          </p:style>
+          <p:txBody>
+            <a:bodyPr rtlCol="0" anchor="ctr"/>
+            <a:lstStyle/>
+            <a:p>
+              <a:pPr algn="ctr"/>
+              <a:endParaRPr lang="ko-KR" altLang="en-US"/>
+            </a:p>
+          </p:txBody>
+        </p:sp>
+      </p:grpSp>
+      <p:sp>
+        <p:nvSpPr>
+          <p:cNvPr id="56" name="직사각형 55">
+            <a:extLst>
+              <a:ext uri="{FF2B5EF4-FFF2-40B4-BE49-F238E27FC236}">
+                <a16:creationId xmlns:a16="http://schemas.microsoft.com/office/drawing/2014/main" id="{C9198099-8735-481E-B9F1-A232AAE1121C}"/>
+              </a:ext>
+            </a:extLst>
+          </p:cNvPr>
+          <p:cNvSpPr/>
+          <p:nvPr/>
+        </p:nvSpPr>
+        <p:spPr>
+          <a:xfrm>
+            <a:off x="9370326" y="3383457"/>
+            <a:ext cx="798990" cy="827999"/>
+          </a:xfrm>
+          <a:prstGeom prst="rect">
+            <a:avLst/>
+          </a:prstGeom>
+          <a:pattFill prst="wdDnDiag">
+            <a:fgClr>
+              <a:schemeClr val="accent4"/>
+            </a:fgClr>
+            <a:bgClr>
+              <a:schemeClr val="accent4">
+                <a:lumMod val="50000"/>
+              </a:schemeClr>
+            </a:bgClr>
+          </a:pattFill>
+        </p:spPr>
+        <p:style>
+          <a:lnRef idx="2">
+            <a:schemeClr val="accent1">
+              <a:shade val="50000"/>
+            </a:schemeClr>
+          </a:lnRef>
+          <a:fillRef idx="1">
+            <a:schemeClr val="accent1"/>
+          </a:fillRef>
+          <a:effectRef idx="0">
+            <a:schemeClr val="accent1"/>
+          </a:effectRef>
+          <a:fontRef idx="minor">
+            <a:schemeClr val="lt1"/>
+          </a:fontRef>
+        </p:style>
+        <p:txBody>
+          <a:bodyPr rtlCol="0" anchor="ctr"/>
+          <a:lstStyle/>
+          <a:p>
+            <a:pPr algn="ctr"/>
+            <a:endParaRPr lang="ko-KR" altLang="en-US"/>
           </a:p>
         </p:txBody>
       </p:sp>
@@ -5642,12 +5868,20 @@
           </a:p>
           <a:p>
             <a:r>
+              <a:rPr lang="ko-KR" altLang="en-US" dirty="0">
+                <a:solidFill>
+                  <a:schemeClr val="bg1"/>
+                </a:solidFill>
+              </a:rPr>
+              <a:t>쓰레기 값의 </a:t>
+            </a:r>
+            <a:r>
               <a:rPr lang="en-US" altLang="ko-KR" dirty="0">
                 <a:solidFill>
                   <a:schemeClr val="bg1"/>
                 </a:solidFill>
               </a:rPr>
-              <a:t>true(16)</a:t>
+              <a:t>bool</a:t>
             </a:r>
           </a:p>
           <a:p>
@@ -5709,6 +5943,61 @@
               </a:rPr>
               <a:t>)</a:t>
             </a:r>
+          </a:p>
+          <a:p>
+            <a:r>
+              <a:rPr lang="en-US" altLang="ko-KR" dirty="0">
+                <a:solidFill>
+                  <a:schemeClr val="bg1"/>
+                </a:solidFill>
+              </a:rPr>
+              <a:t>~</a:t>
+            </a:r>
+            <a:r>
+              <a:rPr lang="en-US" altLang="ko-KR" dirty="0" err="1">
+                <a:solidFill>
+                  <a:schemeClr val="bg1"/>
+                </a:solidFill>
+              </a:rPr>
+              <a:t>CEnemy</a:t>
+            </a:r>
+            <a:r>
+              <a:rPr lang="en-US" altLang="ko-KR" dirty="0">
+                <a:solidFill>
+                  <a:schemeClr val="bg1"/>
+                </a:solidFill>
+              </a:rPr>
+              <a:t>(){ delete </a:t>
+            </a:r>
+            <a:r>
+              <a:rPr lang="en-US" altLang="ko-KR" dirty="0" err="1">
+                <a:solidFill>
+                  <a:schemeClr val="bg1"/>
+                </a:solidFill>
+              </a:rPr>
+              <a:t>m_ptr</a:t>
+            </a:r>
+            <a:r>
+              <a:rPr lang="en-US" altLang="ko-KR" dirty="0">
+                <a:solidFill>
+                  <a:schemeClr val="bg1"/>
+                </a:solidFill>
+              </a:rPr>
+              <a:t>;} </a:t>
+            </a:r>
+            <a:r>
+              <a:rPr lang="ko-KR" altLang="en-US" dirty="0">
+                <a:solidFill>
+                  <a:schemeClr val="bg1"/>
+                </a:solidFill>
+              </a:rPr>
+              <a:t>와중에 복사생성하기</a:t>
+            </a:r>
+            <a:endParaRPr lang="en-US" altLang="ko-KR" dirty="0">
+              <a:solidFill>
+                <a:schemeClr val="bg1"/>
+              </a:solidFill>
+            </a:endParaRPr>
           </a:p>
           <a:p>
             <a:endParaRPr lang="en-US" altLang="ko-KR" dirty="0">
@@ -6050,36 +6339,6 @@
           </a:p>
         </p:txBody>
       </p:sp>
-      <p:pic>
-        <p:nvPicPr>
-          <p:cNvPr id="10" name="그림 9">
-            <a:extLst>
-              <a:ext uri="{FF2B5EF4-FFF2-40B4-BE49-F238E27FC236}">
-                <a16:creationId xmlns:a16="http://schemas.microsoft.com/office/drawing/2014/main" id="{564065DD-F26A-4D41-8AED-7EC1EDD9EE52}"/>
-              </a:ext>
-            </a:extLst>
-          </p:cNvPr>
-          <p:cNvPicPr>
-            <a:picLocks noChangeAspect="1"/>
-          </p:cNvPicPr>
-          <p:nvPr/>
-        </p:nvPicPr>
-        <p:blipFill>
-          <a:blip r:embed="rId3"/>
-          <a:stretch>
-            <a:fillRect/>
-          </a:stretch>
-        </p:blipFill>
-        <p:spPr>
-          <a:xfrm>
-            <a:off x="745726" y="4001294"/>
-            <a:ext cx="6762750" cy="304800"/>
-          </a:xfrm>
-          <a:prstGeom prst="rect">
-            <a:avLst/>
-          </a:prstGeom>
-        </p:spPr>
-      </p:pic>
     </p:spTree>
     <p:extLst>
       <p:ext uri="{BB962C8B-B14F-4D97-AF65-F5344CB8AC3E}">
@@ -7345,6 +7604,293 @@
           </a:p>
         </p:txBody>
       </p:sp>
+      <p:sp>
+        <p:nvSpPr>
+          <p:cNvPr id="10" name="직사각형 9">
+            <a:extLst>
+              <a:ext uri="{FF2B5EF4-FFF2-40B4-BE49-F238E27FC236}">
+                <a16:creationId xmlns:a16="http://schemas.microsoft.com/office/drawing/2014/main" id="{34EC4BBC-3BC1-463B-88C7-AED9A69A6062}"/>
+              </a:ext>
+            </a:extLst>
+          </p:cNvPr>
+          <p:cNvSpPr/>
+          <p:nvPr/>
+        </p:nvSpPr>
+        <p:spPr>
+          <a:xfrm>
+            <a:off x="9144000" y="705348"/>
+            <a:ext cx="585927" cy="464575"/>
+          </a:xfrm>
+          <a:prstGeom prst="rect">
+            <a:avLst/>
+          </a:prstGeom>
+          <a:solidFill>
+            <a:schemeClr val="accent2"/>
+          </a:solidFill>
+          <a:ln>
+            <a:noFill/>
+          </a:ln>
+        </p:spPr>
+        <p:style>
+          <a:lnRef idx="2">
+            <a:schemeClr val="accent1">
+              <a:shade val="50000"/>
+            </a:schemeClr>
+          </a:lnRef>
+          <a:fillRef idx="1">
+            <a:schemeClr val="accent1"/>
+          </a:fillRef>
+          <a:effectRef idx="0">
+            <a:schemeClr val="accent1"/>
+          </a:effectRef>
+          <a:fontRef idx="minor">
+            <a:schemeClr val="lt1"/>
+          </a:fontRef>
+        </p:style>
+        <p:txBody>
+          <a:bodyPr rot="0" spcFirstLastPara="0" vertOverflow="overflow" horzOverflow="overflow" vert="horz" wrap="square" lIns="68580" tIns="34290" rIns="68580" bIns="34290" numCol="1" spcCol="0" rtlCol="0" fromWordArt="0" anchor="ctr" anchorCtr="0" forceAA="0" compatLnSpc="1">
+            <a:prstTxWarp prst="textNoShape">
+              <a:avLst/>
+            </a:prstTxWarp>
+            <a:noAutofit/>
+          </a:bodyPr>
+          <a:lstStyle/>
+          <a:p>
+            <a:pPr algn="ctr"/>
+            <a:endParaRPr lang="ko-KR" altLang="en-US" sz="1350"/>
+          </a:p>
+        </p:txBody>
+      </p:sp>
+      <p:sp>
+        <p:nvSpPr>
+          <p:cNvPr id="11" name="직사각형 10">
+            <a:extLst>
+              <a:ext uri="{FF2B5EF4-FFF2-40B4-BE49-F238E27FC236}">
+                <a16:creationId xmlns:a16="http://schemas.microsoft.com/office/drawing/2014/main" id="{0EF11228-DCF2-4F60-BFEC-3404D801F843}"/>
+              </a:ext>
+            </a:extLst>
+          </p:cNvPr>
+          <p:cNvSpPr/>
+          <p:nvPr/>
+        </p:nvSpPr>
+        <p:spPr>
+          <a:xfrm>
+            <a:off x="9144002" y="1169923"/>
+            <a:ext cx="585926" cy="464575"/>
+          </a:xfrm>
+          <a:prstGeom prst="rect">
+            <a:avLst/>
+          </a:prstGeom>
+          <a:solidFill>
+            <a:schemeClr val="accent4"/>
+          </a:solidFill>
+          <a:ln>
+            <a:noFill/>
+          </a:ln>
+        </p:spPr>
+        <p:style>
+          <a:lnRef idx="2">
+            <a:schemeClr val="accent1">
+              <a:shade val="50000"/>
+            </a:schemeClr>
+          </a:lnRef>
+          <a:fillRef idx="1">
+            <a:schemeClr val="accent1"/>
+          </a:fillRef>
+          <a:effectRef idx="0">
+            <a:schemeClr val="accent1"/>
+          </a:effectRef>
+          <a:fontRef idx="minor">
+            <a:schemeClr val="lt1"/>
+          </a:fontRef>
+        </p:style>
+        <p:txBody>
+          <a:bodyPr rot="0" spcFirstLastPara="0" vertOverflow="overflow" horzOverflow="overflow" vert="horz" wrap="square" lIns="68580" tIns="34290" rIns="68580" bIns="34290" numCol="1" spcCol="0" rtlCol="0" fromWordArt="0" anchor="ctr" anchorCtr="0" forceAA="0" compatLnSpc="1">
+            <a:prstTxWarp prst="textNoShape">
+              <a:avLst/>
+            </a:prstTxWarp>
+            <a:noAutofit/>
+          </a:bodyPr>
+          <a:lstStyle/>
+          <a:p>
+            <a:pPr algn="ctr"/>
+            <a:endParaRPr lang="ko-KR" altLang="en-US" sz="1350"/>
+          </a:p>
+        </p:txBody>
+      </p:sp>
+      <p:sp>
+        <p:nvSpPr>
+          <p:cNvPr id="12" name="직사각형 11">
+            <a:extLst>
+              <a:ext uri="{FF2B5EF4-FFF2-40B4-BE49-F238E27FC236}">
+                <a16:creationId xmlns:a16="http://schemas.microsoft.com/office/drawing/2014/main" id="{22E1CB8A-E336-48F3-9D74-7364E6B1398D}"/>
+              </a:ext>
+            </a:extLst>
+          </p:cNvPr>
+          <p:cNvSpPr/>
+          <p:nvPr/>
+        </p:nvSpPr>
+        <p:spPr>
+          <a:xfrm>
+            <a:off x="9144000" y="1634498"/>
+            <a:ext cx="585927" cy="464575"/>
+          </a:xfrm>
+          <a:prstGeom prst="rect">
+            <a:avLst/>
+          </a:prstGeom>
+          <a:solidFill>
+            <a:schemeClr val="accent6"/>
+          </a:solidFill>
+          <a:ln>
+            <a:noFill/>
+          </a:ln>
+        </p:spPr>
+        <p:style>
+          <a:lnRef idx="2">
+            <a:schemeClr val="accent1">
+              <a:shade val="50000"/>
+            </a:schemeClr>
+          </a:lnRef>
+          <a:fillRef idx="1">
+            <a:schemeClr val="accent1"/>
+          </a:fillRef>
+          <a:effectRef idx="0">
+            <a:schemeClr val="accent1"/>
+          </a:effectRef>
+          <a:fontRef idx="minor">
+            <a:schemeClr val="lt1"/>
+          </a:fontRef>
+        </p:style>
+        <p:txBody>
+          <a:bodyPr rot="0" spcFirstLastPara="0" vertOverflow="overflow" horzOverflow="overflow" vert="horz" wrap="square" lIns="68580" tIns="34290" rIns="68580" bIns="34290" numCol="1" spcCol="0" rtlCol="0" fromWordArt="0" anchor="ctr" anchorCtr="0" forceAA="0" compatLnSpc="1">
+            <a:prstTxWarp prst="textNoShape">
+              <a:avLst/>
+            </a:prstTxWarp>
+            <a:noAutofit/>
+          </a:bodyPr>
+          <a:lstStyle/>
+          <a:p>
+            <a:pPr algn="ctr"/>
+            <a:endParaRPr lang="ko-KR" altLang="en-US" sz="1350"/>
+          </a:p>
+        </p:txBody>
+      </p:sp>
+      <p:sp>
+        <p:nvSpPr>
+          <p:cNvPr id="13" name="직사각형 12">
+            <a:extLst>
+              <a:ext uri="{FF2B5EF4-FFF2-40B4-BE49-F238E27FC236}">
+                <a16:creationId xmlns:a16="http://schemas.microsoft.com/office/drawing/2014/main" id="{4A12DC26-3A80-4ECC-8101-4DE0A485759D}"/>
+              </a:ext>
+            </a:extLst>
+          </p:cNvPr>
+          <p:cNvSpPr/>
+          <p:nvPr/>
+        </p:nvSpPr>
+        <p:spPr>
+          <a:xfrm>
+            <a:off x="9144001" y="2099073"/>
+            <a:ext cx="585926" cy="464575"/>
+          </a:xfrm>
+          <a:prstGeom prst="rect">
+            <a:avLst/>
+          </a:prstGeom>
+          <a:solidFill>
+            <a:schemeClr val="accent5"/>
+          </a:solidFill>
+          <a:ln>
+            <a:noFill/>
+          </a:ln>
+        </p:spPr>
+        <p:style>
+          <a:lnRef idx="2">
+            <a:schemeClr val="accent1">
+              <a:shade val="50000"/>
+            </a:schemeClr>
+          </a:lnRef>
+          <a:fillRef idx="1">
+            <a:schemeClr val="accent1"/>
+          </a:fillRef>
+          <a:effectRef idx="0">
+            <a:schemeClr val="accent1"/>
+          </a:effectRef>
+          <a:fontRef idx="minor">
+            <a:schemeClr val="lt1"/>
+          </a:fontRef>
+        </p:style>
+        <p:txBody>
+          <a:bodyPr rot="0" spcFirstLastPara="0" vertOverflow="overflow" horzOverflow="overflow" vert="horz" wrap="square" lIns="68580" tIns="34290" rIns="68580" bIns="34290" numCol="1" spcCol="0" rtlCol="0" fromWordArt="0" anchor="ctr" anchorCtr="0" forceAA="0" compatLnSpc="1">
+            <a:prstTxWarp prst="textNoShape">
+              <a:avLst/>
+            </a:prstTxWarp>
+            <a:noAutofit/>
+          </a:bodyPr>
+          <a:lstStyle/>
+          <a:p>
+            <a:pPr algn="ctr"/>
+            <a:endParaRPr lang="ko-KR" altLang="en-US"/>
+          </a:p>
+        </p:txBody>
+      </p:sp>
+      <p:sp>
+        <p:nvSpPr>
+          <p:cNvPr id="14" name="직사각형 13">
+            <a:extLst>
+              <a:ext uri="{FF2B5EF4-FFF2-40B4-BE49-F238E27FC236}">
+                <a16:creationId xmlns:a16="http://schemas.microsoft.com/office/drawing/2014/main" id="{7AFE10F0-7B67-4801-A845-A376E95D5507}"/>
+              </a:ext>
+            </a:extLst>
+          </p:cNvPr>
+          <p:cNvSpPr/>
+          <p:nvPr/>
+        </p:nvSpPr>
+        <p:spPr>
+          <a:xfrm>
+            <a:off x="9144001" y="2563648"/>
+            <a:ext cx="585926" cy="464575"/>
+          </a:xfrm>
+          <a:prstGeom prst="rect">
+            <a:avLst/>
+          </a:prstGeom>
+          <a:solidFill>
+            <a:schemeClr val="bg2">
+              <a:lumMod val="75000"/>
+            </a:schemeClr>
+          </a:solidFill>
+          <a:ln>
+            <a:noFill/>
+          </a:ln>
+        </p:spPr>
+        <p:style>
+          <a:lnRef idx="2">
+            <a:schemeClr val="accent1">
+              <a:shade val="50000"/>
+            </a:schemeClr>
+          </a:lnRef>
+          <a:fillRef idx="1">
+            <a:schemeClr val="accent1"/>
+          </a:fillRef>
+          <a:effectRef idx="0">
+            <a:schemeClr val="accent1"/>
+          </a:effectRef>
+          <a:fontRef idx="minor">
+            <a:schemeClr val="lt1"/>
+          </a:fontRef>
+        </p:style>
+        <p:txBody>
+          <a:bodyPr rot="0" spcFirstLastPara="0" vertOverflow="overflow" horzOverflow="overflow" vert="horz" wrap="square" lIns="68580" tIns="34290" rIns="68580" bIns="34290" numCol="1" spcCol="0" rtlCol="0" fromWordArt="0" anchor="ctr" anchorCtr="0" forceAA="0" compatLnSpc="1">
+            <a:prstTxWarp prst="textNoShape">
+              <a:avLst/>
+            </a:prstTxWarp>
+            <a:noAutofit/>
+          </a:bodyPr>
+          <a:lstStyle/>
+          <a:p>
+            <a:pPr algn="ctr"/>
+            <a:endParaRPr lang="ko-KR" altLang="en-US"/>
+          </a:p>
+        </p:txBody>
+      </p:sp>
     </p:spTree>
     <p:extLst>
       <p:ext uri="{BB962C8B-B14F-4D97-AF65-F5344CB8AC3E}">
@@ -10012,7 +10558,7 @@
 <file path=ppt/theme/theme1.xml><?xml version="1.0" encoding="utf-8"?>
 <a:theme xmlns:a="http://schemas.openxmlformats.org/drawingml/2006/main" name="Office 테마">
   <a:themeElements>
-    <a:clrScheme name="Office 테마">
+    <a:clrScheme name="Office">
       <a:dk1>
         <a:sysClr val="windowText" lastClr="000000"/>
       </a:dk1>

</xml_diff>

<commit_message>
cut silence sound - tesla
</commit_message>
<xml_diff>
--- a/발표자료/API 텀프로젝트 발표자료.pptx
+++ b/발표자료/API 텀프로젝트 발표자료.pptx
@@ -14,7 +14,8 @@
     <p:sldId id="266" r:id="rId8"/>
     <p:sldId id="264" r:id="rId9"/>
     <p:sldId id="261" r:id="rId10"/>
-    <p:sldId id="262" r:id="rId11"/>
+    <p:sldId id="269" r:id="rId11"/>
+    <p:sldId id="262" r:id="rId12"/>
   </p:sldIdLst>
   <p:sldSz cx="9144000" cy="6858000" type="screen4x3"/>
   <p:notesSz cx="6858000" cy="9144000"/>
@@ -3406,6 +3407,314 @@
 <file path=ppt/slides/slide10.xml><?xml version="1.0" encoding="utf-8"?>
 <p:sld xmlns:a="http://schemas.openxmlformats.org/drawingml/2006/main" xmlns:r="http://schemas.openxmlformats.org/officeDocument/2006/relationships" xmlns:p="http://schemas.openxmlformats.org/presentationml/2006/main">
   <p:cSld>
+    <p:spTree>
+      <p:nvGrpSpPr>
+        <p:cNvPr id="1" name=""/>
+        <p:cNvGrpSpPr/>
+        <p:nvPr/>
+      </p:nvGrpSpPr>
+      <p:grpSpPr>
+        <a:xfrm>
+          <a:off x="0" y="0"/>
+          <a:ext cx="0" cy="0"/>
+          <a:chOff x="0" y="0"/>
+          <a:chExt cx="0" cy="0"/>
+        </a:xfrm>
+      </p:grpSpPr>
+      <p:pic>
+        <p:nvPicPr>
+          <p:cNvPr id="5" name="그림 4">
+            <a:extLst>
+              <a:ext uri="{FF2B5EF4-FFF2-40B4-BE49-F238E27FC236}">
+                <a16:creationId xmlns:a16="http://schemas.microsoft.com/office/drawing/2014/main" id="{CA94D878-CD7C-4D09-8FC0-A1DFB921336E}"/>
+              </a:ext>
+            </a:extLst>
+          </p:cNvPr>
+          <p:cNvPicPr>
+            <a:picLocks noChangeAspect="1"/>
+          </p:cNvPicPr>
+          <p:nvPr/>
+        </p:nvPicPr>
+        <p:blipFill>
+          <a:blip r:embed="rId2">
+            <a:extLst>
+              <a:ext uri="{28A0092B-C50C-407E-A947-70E740481C1C}">
+                <a14:useLocalDpi xmlns:a14="http://schemas.microsoft.com/office/drawing/2010/main" val="0"/>
+              </a:ext>
+            </a:extLst>
+          </a:blip>
+          <a:stretch>
+            <a:fillRect/>
+          </a:stretch>
+        </p:blipFill>
+        <p:spPr>
+          <a:xfrm>
+            <a:off x="3181850" y="516806"/>
+            <a:ext cx="2676070" cy="2676070"/>
+          </a:xfrm>
+          <a:prstGeom prst="rect">
+            <a:avLst/>
+          </a:prstGeom>
+        </p:spPr>
+      </p:pic>
+      <p:sp>
+        <p:nvSpPr>
+          <p:cNvPr id="6" name="TextBox 5">
+            <a:extLst>
+              <a:ext uri="{FF2B5EF4-FFF2-40B4-BE49-F238E27FC236}">
+                <a16:creationId xmlns:a16="http://schemas.microsoft.com/office/drawing/2014/main" id="{F899C17E-AB09-44DA-9557-E2D085210585}"/>
+              </a:ext>
+            </a:extLst>
+          </p:cNvPr>
+          <p:cNvSpPr txBox="1"/>
+          <p:nvPr/>
+        </p:nvSpPr>
+        <p:spPr>
+          <a:xfrm>
+            <a:off x="3377677" y="2731211"/>
+            <a:ext cx="2284415" cy="923330"/>
+          </a:xfrm>
+          <a:prstGeom prst="rect">
+            <a:avLst/>
+          </a:prstGeom>
+          <a:noFill/>
+        </p:spPr>
+        <p:txBody>
+          <a:bodyPr wrap="square" rtlCol="0">
+            <a:spAutoFit/>
+          </a:bodyPr>
+          <a:lstStyle/>
+          <a:p>
+            <a:r>
+              <a:rPr lang="en-US" altLang="ko-KR" sz="5400" dirty="0">
+                <a:solidFill>
+                  <a:schemeClr val="bg1"/>
+                </a:solidFill>
+                <a:latin typeface="Bauhaus 93" panose="04030905020B02020C02" pitchFamily="82" charset="0"/>
+                <a:ea typeface="Adobe Fan Heiti Std B" panose="020B0700000000000000" pitchFamily="34" charset="-128"/>
+              </a:rPr>
+              <a:t>GitHub</a:t>
+            </a:r>
+            <a:endParaRPr lang="ko-KR" altLang="en-US" sz="5400" dirty="0">
+              <a:solidFill>
+                <a:schemeClr val="bg1"/>
+              </a:solidFill>
+              <a:latin typeface="Bauhaus 93" panose="04030905020B02020C02" pitchFamily="82" charset="0"/>
+            </a:endParaRPr>
+          </a:p>
+        </p:txBody>
+      </p:sp>
+      <p:pic>
+        <p:nvPicPr>
+          <p:cNvPr id="20" name="그림 19" descr="물건이(가) 표시된 사진&#10;&#10;매우 높은 신뢰도로 생성된 설명">
+            <a:extLst>
+              <a:ext uri="{FF2B5EF4-FFF2-40B4-BE49-F238E27FC236}">
+                <a16:creationId xmlns:a16="http://schemas.microsoft.com/office/drawing/2014/main" id="{37240033-BCAE-4C1B-B30A-1A82FE8E45CE}"/>
+              </a:ext>
+            </a:extLst>
+          </p:cNvPr>
+          <p:cNvPicPr>
+            <a:picLocks noChangeAspect="1"/>
+          </p:cNvPicPr>
+          <p:nvPr/>
+        </p:nvPicPr>
+        <p:blipFill rotWithShape="1">
+          <a:blip r:embed="rId3">
+            <a:extLst>
+              <a:ext uri="{28A0092B-C50C-407E-A947-70E740481C1C}">
+                <a14:useLocalDpi xmlns:a14="http://schemas.microsoft.com/office/drawing/2010/main" val="0"/>
+              </a:ext>
+            </a:extLst>
+          </a:blip>
+          <a:srcRect l="11456" t="-8817" r="57278" b="1"/>
+          <a:stretch/>
+        </p:blipFill>
+        <p:spPr>
+          <a:xfrm>
+            <a:off x="0" y="4264281"/>
+            <a:ext cx="2627287" cy="2286000"/>
+          </a:xfrm>
+          <a:prstGeom prst="rect">
+            <a:avLst/>
+          </a:prstGeom>
+        </p:spPr>
+      </p:pic>
+      <p:pic>
+        <p:nvPicPr>
+          <p:cNvPr id="22" name="그림 21" descr="물건이(가) 표시된 사진&#10;&#10;매우 높은 신뢰도로 생성된 설명">
+            <a:extLst>
+              <a:ext uri="{FF2B5EF4-FFF2-40B4-BE49-F238E27FC236}">
+                <a16:creationId xmlns:a16="http://schemas.microsoft.com/office/drawing/2014/main" id="{0B13E3E9-CFD5-40C9-A002-99D0ED65DA8C}"/>
+              </a:ext>
+            </a:extLst>
+          </p:cNvPr>
+          <p:cNvPicPr>
+            <a:picLocks noChangeAspect="1"/>
+          </p:cNvPicPr>
+          <p:nvPr/>
+        </p:nvPicPr>
+        <p:blipFill rotWithShape="1">
+          <a:blip r:embed="rId3">
+            <a:extLst>
+              <a:ext uri="{28A0092B-C50C-407E-A947-70E740481C1C}">
+                <a14:useLocalDpi xmlns:a14="http://schemas.microsoft.com/office/drawing/2010/main" val="0"/>
+              </a:ext>
+            </a:extLst>
+          </a:blip>
+          <a:srcRect l="60380" r="12911"/>
+          <a:stretch/>
+        </p:blipFill>
+        <p:spPr>
+          <a:xfrm>
+            <a:off x="6701737" y="4264281"/>
+            <a:ext cx="2442259" cy="2286000"/>
+          </a:xfrm>
+          <a:prstGeom prst="rect">
+            <a:avLst/>
+          </a:prstGeom>
+        </p:spPr>
+      </p:pic>
+      <p:cxnSp>
+        <p:nvCxnSpPr>
+          <p:cNvPr id="26" name="연결선: 구부러짐 25">
+            <a:extLst>
+              <a:ext uri="{FF2B5EF4-FFF2-40B4-BE49-F238E27FC236}">
+                <a16:creationId xmlns:a16="http://schemas.microsoft.com/office/drawing/2014/main" id="{84872880-9D64-4E57-8864-82B659DB4FB9}"/>
+              </a:ext>
+            </a:extLst>
+          </p:cNvPr>
+          <p:cNvCxnSpPr>
+            <a:cxnSpLocks/>
+            <a:stCxn id="20" idx="0"/>
+            <a:endCxn id="5" idx="1"/>
+          </p:cNvCxnSpPr>
+          <p:nvPr/>
+        </p:nvCxnSpPr>
+        <p:spPr>
+          <a:xfrm rot="5400000" flipH="1" flipV="1">
+            <a:off x="1043027" y="2125458"/>
+            <a:ext cx="2409440" cy="1868206"/>
+          </a:xfrm>
+          <a:prstGeom prst="curvedConnector2">
+            <a:avLst/>
+          </a:prstGeom>
+          <a:ln w="57150">
+            <a:solidFill>
+              <a:schemeClr val="bg1"/>
+            </a:solidFill>
+            <a:headEnd type="arrow" w="med" len="med"/>
+            <a:tailEnd type="arrow" w="med" len="med"/>
+          </a:ln>
+        </p:spPr>
+        <p:style>
+          <a:lnRef idx="1">
+            <a:schemeClr val="accent1"/>
+          </a:lnRef>
+          <a:fillRef idx="0">
+            <a:schemeClr val="accent1"/>
+          </a:fillRef>
+          <a:effectRef idx="0">
+            <a:schemeClr val="accent1"/>
+          </a:effectRef>
+          <a:fontRef idx="minor">
+            <a:schemeClr val="tx1"/>
+          </a:fontRef>
+        </p:style>
+      </p:cxnSp>
+      <p:cxnSp>
+        <p:nvCxnSpPr>
+          <p:cNvPr id="1024" name="연결선: 구부러짐 1023">
+            <a:extLst>
+              <a:ext uri="{FF2B5EF4-FFF2-40B4-BE49-F238E27FC236}">
+                <a16:creationId xmlns:a16="http://schemas.microsoft.com/office/drawing/2014/main" id="{3D4B7DC7-FD5C-453F-B90D-0FC664C9A7B9}"/>
+              </a:ext>
+            </a:extLst>
+          </p:cNvPr>
+          <p:cNvCxnSpPr>
+            <a:stCxn id="5" idx="3"/>
+            <a:endCxn id="22" idx="0"/>
+          </p:cNvCxnSpPr>
+          <p:nvPr/>
+        </p:nvCxnSpPr>
+        <p:spPr>
+          <a:xfrm>
+            <a:off x="5857920" y="1854841"/>
+            <a:ext cx="2064947" cy="2409440"/>
+          </a:xfrm>
+          <a:prstGeom prst="curvedConnector2">
+            <a:avLst/>
+          </a:prstGeom>
+          <a:ln w="57150">
+            <a:solidFill>
+              <a:schemeClr val="bg1"/>
+            </a:solidFill>
+            <a:headEnd type="arrow" w="med" len="med"/>
+            <a:tailEnd type="arrow" w="med" len="med"/>
+          </a:ln>
+        </p:spPr>
+        <p:style>
+          <a:lnRef idx="1">
+            <a:schemeClr val="accent1"/>
+          </a:lnRef>
+          <a:fillRef idx="0">
+            <a:schemeClr val="accent1"/>
+          </a:fillRef>
+          <a:effectRef idx="0">
+            <a:schemeClr val="accent1"/>
+          </a:effectRef>
+          <a:fontRef idx="minor">
+            <a:schemeClr val="tx1"/>
+          </a:fontRef>
+        </p:style>
+      </p:cxnSp>
+      <p:sp>
+        <p:nvSpPr>
+          <p:cNvPr id="1042" name="TextBox 1041">
+            <a:extLst>
+              <a:ext uri="{FF2B5EF4-FFF2-40B4-BE49-F238E27FC236}">
+                <a16:creationId xmlns:a16="http://schemas.microsoft.com/office/drawing/2014/main" id="{3E29EB25-B2AD-45CD-99DB-67C557C5B46D}"/>
+              </a:ext>
+            </a:extLst>
+          </p:cNvPr>
+          <p:cNvSpPr txBox="1"/>
+          <p:nvPr/>
+        </p:nvSpPr>
+        <p:spPr>
+          <a:xfrm>
+            <a:off x="3530278" y="266218"/>
+            <a:ext cx="184731" cy="369332"/>
+          </a:xfrm>
+          <a:prstGeom prst="rect">
+            <a:avLst/>
+          </a:prstGeom>
+          <a:noFill/>
+        </p:spPr>
+        <p:txBody>
+          <a:bodyPr wrap="none" rtlCol="0">
+            <a:spAutoFit/>
+          </a:bodyPr>
+          <a:lstStyle/>
+          <a:p>
+            <a:endParaRPr lang="ko-KR" altLang="en-US" dirty="0"/>
+          </a:p>
+        </p:txBody>
+      </p:sp>
+    </p:spTree>
+    <p:extLst>
+      <p:ext uri="{BB962C8B-B14F-4D97-AF65-F5344CB8AC3E}">
+        <p14:creationId xmlns:p14="http://schemas.microsoft.com/office/powerpoint/2010/main" val="338927286"/>
+      </p:ext>
+    </p:extLst>
+  </p:cSld>
+  <p:clrMapOvr>
+    <a:masterClrMapping/>
+  </p:clrMapOvr>
+</p:sld>
+</file>
+
+<file path=ppt/slides/slide11.xml><?xml version="1.0" encoding="utf-8"?>
+<p:sld xmlns:a="http://schemas.openxmlformats.org/drawingml/2006/main" xmlns:r="http://schemas.openxmlformats.org/officeDocument/2006/relationships" xmlns:p="http://schemas.openxmlformats.org/presentationml/2006/main">
+  <p:cSld>
     <p:bg>
       <p:bgPr>
         <a:solidFill>
@@ -9684,7 +9993,7 @@
               </a:spcBef>
             </a:pPr>
             <a:r>
-              <a:rPr lang="ko-KR" altLang="en-US" sz="4050" dirty="0">
+              <a:rPr lang="ko-KR" altLang="en-US" sz="4800" dirty="0">
                 <a:solidFill>
                   <a:srgbClr val="FFFFFF"/>
                 </a:solidFill>

</xml_diff>